<commit_message>
more typos, separated hypertuning from evaluation
</commit_message>
<xml_diff>
--- a/presentation/Presentation_road_safety.pptx
+++ b/presentation/Presentation_road_safety.pptx
@@ -12,9 +12,10 @@
     <p:sldId id="276" r:id="rId6"/>
     <p:sldId id="280" r:id="rId7"/>
     <p:sldId id="267" r:id="rId8"/>
-    <p:sldId id="272" r:id="rId9"/>
-    <p:sldId id="269" r:id="rId10"/>
-    <p:sldId id="275" r:id="rId11"/>
+    <p:sldId id="281" r:id="rId9"/>
+    <p:sldId id="272" r:id="rId10"/>
+    <p:sldId id="269" r:id="rId11"/>
+    <p:sldId id="275" r:id="rId12"/>
   </p:sldIdLst>
   <p:sldSz cx="12192000" cy="6858000"/>
   <p:notesSz cx="6858000" cy="9144000"/>
@@ -4139,6 +4140,173 @@
       </p:grpSpPr>
       <p:sp>
         <p:nvSpPr>
+          <p:cNvPr id="2" name="Title 1">
+            <a:extLst>
+              <a:ext uri="{FF2B5EF4-FFF2-40B4-BE49-F238E27FC236}">
+                <a16:creationId xmlns:a16="http://schemas.microsoft.com/office/drawing/2014/main" id="{311671A4-866C-534A-125F-F22A758B4D6A}"/>
+              </a:ext>
+            </a:extLst>
+          </p:cNvPr>
+          <p:cNvSpPr>
+            <a:spLocks noGrp="1"/>
+          </p:cNvSpPr>
+          <p:nvPr>
+            <p:ph type="title"/>
+          </p:nvPr>
+        </p:nvSpPr>
+        <p:spPr>
+          <a:xfrm>
+            <a:off x="0" y="-1"/>
+            <a:ext cx="12192000" cy="1933903"/>
+          </a:xfrm>
+          <a:solidFill>
+            <a:schemeClr val="accent6">
+              <a:lumMod val="50000"/>
+            </a:schemeClr>
+          </a:solidFill>
+        </p:spPr>
+        <p:txBody>
+          <a:bodyPr>
+            <a:normAutofit/>
+          </a:bodyPr>
+          <a:lstStyle/>
+          <a:p>
+            <a:pPr algn="ctr"/>
+            <a:br>
+              <a:rPr lang="en-US" sz="4000" dirty="0">
+                <a:latin typeface="Calibri" panose="020F0502020204030204" pitchFamily="34" charset="0"/>
+                <a:cs typeface="Calibri" panose="020F0502020204030204" pitchFamily="34" charset="0"/>
+              </a:rPr>
+            </a:br>
+            <a:r>
+              <a:rPr lang="en-US" sz="4000" dirty="0">
+                <a:solidFill>
+                  <a:schemeClr val="bg1"/>
+                </a:solidFill>
+                <a:latin typeface="Calibri" panose="020F0502020204030204" pitchFamily="34" charset="0"/>
+                <a:cs typeface="Calibri" panose="020F0502020204030204" pitchFamily="34" charset="0"/>
+              </a:rPr>
+              <a:t>Potential Future Directions</a:t>
+            </a:r>
+            <a:r>
+              <a:rPr lang="en-US" sz="4000" dirty="0">
+                <a:latin typeface="Calibri" panose="020F0502020204030204" pitchFamily="34" charset="0"/>
+                <a:cs typeface="Calibri" panose="020F0502020204030204" pitchFamily="34" charset="0"/>
+              </a:rPr>
+              <a:t>	</a:t>
+            </a:r>
+            <a:br>
+              <a:rPr lang="en-US" sz="4000" dirty="0">
+                <a:latin typeface="Calibri" panose="020F0502020204030204" pitchFamily="34" charset="0"/>
+                <a:cs typeface="Calibri" panose="020F0502020204030204" pitchFamily="34" charset="0"/>
+              </a:rPr>
+            </a:br>
+            <a:endParaRPr lang="en-US" sz="4400" dirty="0">
+              <a:latin typeface="Calibri" panose="020F0502020204030204" pitchFamily="34" charset="0"/>
+              <a:cs typeface="Calibri" panose="020F0502020204030204" pitchFamily="34" charset="0"/>
+            </a:endParaRPr>
+          </a:p>
+        </p:txBody>
+      </p:sp>
+      <p:sp>
+        <p:nvSpPr>
+          <p:cNvPr id="4" name="TextBox 3">
+            <a:extLst>
+              <a:ext uri="{FF2B5EF4-FFF2-40B4-BE49-F238E27FC236}">
+                <a16:creationId xmlns:a16="http://schemas.microsoft.com/office/drawing/2014/main" id="{3BEA5A86-F493-7464-ED41-8D17A2F15931}"/>
+              </a:ext>
+            </a:extLst>
+          </p:cNvPr>
+          <p:cNvSpPr txBox="1"/>
+          <p:nvPr/>
+        </p:nvSpPr>
+        <p:spPr>
+          <a:xfrm>
+            <a:off x="1713722" y="3599844"/>
+            <a:ext cx="10478278" cy="1631216"/>
+          </a:xfrm>
+          <a:prstGeom prst="rect">
+            <a:avLst/>
+          </a:prstGeom>
+          <a:noFill/>
+        </p:spPr>
+        <p:txBody>
+          <a:bodyPr wrap="square" rtlCol="0">
+            <a:spAutoFit/>
+          </a:bodyPr>
+          <a:lstStyle/>
+          <a:p>
+            <a:pPr marL="285750" indent="-285750">
+              <a:buFont typeface="Wingdings" panose="05000000000000000000" pitchFamily="2" charset="2"/>
+              <a:buChar char="Ø"/>
+            </a:pPr>
+            <a:r>
+              <a:rPr lang="en-US" sz="2500" dirty="0">
+                <a:latin typeface="Arial" panose="020B0604020202020204" pitchFamily="34" charset="0"/>
+                <a:cs typeface="Arial" panose="020B0604020202020204" pitchFamily="34" charset="0"/>
+              </a:rPr>
+              <a:t>Data from other regions</a:t>
+            </a:r>
+          </a:p>
+          <a:p>
+            <a:endParaRPr lang="en-US" sz="2500" dirty="0">
+              <a:latin typeface="Arial" panose="020B0604020202020204" pitchFamily="34" charset="0"/>
+              <a:cs typeface="Arial" panose="020B0604020202020204" pitchFamily="34" charset="0"/>
+            </a:endParaRPr>
+          </a:p>
+          <a:p>
+            <a:endParaRPr lang="en-US" sz="2500" dirty="0">
+              <a:latin typeface="Arial" panose="020B0604020202020204" pitchFamily="34" charset="0"/>
+              <a:cs typeface="Arial" panose="020B0604020202020204" pitchFamily="34" charset="0"/>
+            </a:endParaRPr>
+          </a:p>
+          <a:p>
+            <a:pPr marL="285750" indent="-285750">
+              <a:buFont typeface="Wingdings" panose="05000000000000000000" pitchFamily="2" charset="2"/>
+              <a:buChar char="Ø"/>
+            </a:pPr>
+            <a:r>
+              <a:rPr lang="en-US" sz="2500" dirty="0">
+                <a:latin typeface="Arial" panose="020B0604020202020204" pitchFamily="34" charset="0"/>
+                <a:cs typeface="Arial" panose="020B0604020202020204" pitchFamily="34" charset="0"/>
+              </a:rPr>
+              <a:t>Different features: better models?</a:t>
+            </a:r>
+          </a:p>
+        </p:txBody>
+      </p:sp>
+    </p:spTree>
+    <p:extLst>
+      <p:ext uri="{BB962C8B-B14F-4D97-AF65-F5344CB8AC3E}">
+        <p14:creationId xmlns:p14="http://schemas.microsoft.com/office/powerpoint/2010/main" val="2581081781"/>
+      </p:ext>
+    </p:extLst>
+  </p:cSld>
+  <p:clrMapOvr>
+    <a:masterClrMapping/>
+  </p:clrMapOvr>
+</p:sld>
+</file>
+
+<file path=ppt/slides/slide11.xml><?xml version="1.0" encoding="utf-8"?>
+<p:sld xmlns:a="http://schemas.openxmlformats.org/drawingml/2006/main" xmlns:r="http://schemas.openxmlformats.org/officeDocument/2006/relationships" xmlns:p="http://schemas.openxmlformats.org/presentationml/2006/main" showMasterSp="0">
+  <p:cSld>
+    <p:spTree>
+      <p:nvGrpSpPr>
+        <p:cNvPr id="1" name=""/>
+        <p:cNvGrpSpPr/>
+        <p:nvPr/>
+      </p:nvGrpSpPr>
+      <p:grpSpPr>
+        <a:xfrm>
+          <a:off x="0" y="0"/>
+          <a:ext cx="0" cy="0"/>
+          <a:chOff x="0" y="0"/>
+          <a:chExt cx="0" cy="0"/>
+        </a:xfrm>
+      </p:grpSpPr>
+      <p:sp>
+        <p:nvSpPr>
           <p:cNvPr id="4" name="Content Placeholder 3">
             <a:extLst>
               <a:ext uri="{FF2B5EF4-FFF2-40B4-BE49-F238E27FC236}">
@@ -5047,7 +5215,7 @@
           <a:lstStyle/>
           <a:p>
             <a:pPr algn="ctr"/>
-            <a:endParaRPr lang="en-US"/>
+            <a:endParaRPr lang="en-US" dirty="0"/>
           </a:p>
         </p:txBody>
       </p:sp>
@@ -5152,7 +5320,7 @@
           <a:lstStyle/>
           <a:p>
             <a:r>
-              <a:rPr lang="en-US" sz="2500" dirty="0" err="1">
+              <a:rPr lang="en-US" sz="2500" b="1" dirty="0" err="1">
                 <a:latin typeface="Arial" panose="020B0604020202020204" pitchFamily="34" charset="0"/>
                 <a:cs typeface="Arial" panose="020B0604020202020204" pitchFamily="34" charset="0"/>
               </a:rPr>
@@ -5163,7 +5331,7 @@
                 <a:latin typeface="Arial" panose="020B0604020202020204" pitchFamily="34" charset="0"/>
                 <a:cs typeface="Arial" panose="020B0604020202020204" pitchFamily="34" charset="0"/>
               </a:rPr>
-              <a:t> was chosen as a classifier for our ternary classification problem.</a:t>
+              <a:t> was selected for our ternary classification problem:</a:t>
             </a:r>
           </a:p>
           <a:p>
@@ -5182,7 +5350,7 @@
                 <a:latin typeface="Arial" panose="020B0604020202020204" pitchFamily="34" charset="0"/>
                 <a:cs typeface="Arial" panose="020B0604020202020204" pitchFamily="34" charset="0"/>
               </a:rPr>
-              <a:t>Imbalanced dataset: 1% of accidents are serious/fatal, 20% are minor.</a:t>
+              <a:t>Imbalanced dataset: 1% of accidents are serious/fatal, 20% minor.</a:t>
             </a:r>
           </a:p>
           <a:p>
@@ -5204,7 +5372,7 @@
                 <a:latin typeface="Arial" panose="020B0604020202020204" pitchFamily="34" charset="0"/>
                 <a:cs typeface="Arial" panose="020B0604020202020204" pitchFamily="34" charset="0"/>
               </a:rPr>
-              <a:t>2. Speed and Efficiency</a:t>
+              <a:t>Speed and Efficiency</a:t>
             </a:r>
           </a:p>
           <a:p>
@@ -5223,7 +5391,7 @@
                 <a:latin typeface="Arial" panose="020B0604020202020204" pitchFamily="34" charset="0"/>
                 <a:cs typeface="Arial" panose="020B0604020202020204" pitchFamily="34" charset="0"/>
               </a:rPr>
-              <a:t>3. Missing Values</a:t>
+              <a:t>Missing Values</a:t>
             </a:r>
           </a:p>
           <a:p>
@@ -5242,7 +5410,26 @@
                 <a:latin typeface="Arial" panose="020B0604020202020204" pitchFamily="34" charset="0"/>
                 <a:cs typeface="Arial" panose="020B0604020202020204" pitchFamily="34" charset="0"/>
               </a:rPr>
-              <a:t>4. Feature Interaction Handling</a:t>
+              <a:t>Feature Interaction Handling</a:t>
+            </a:r>
+          </a:p>
+          <a:p>
+            <a:pPr marL="342900" indent="-342900">
+              <a:buFont typeface="Wingdings" panose="05000000000000000000" pitchFamily="2" charset="2"/>
+              <a:buChar char="Ø"/>
+            </a:pPr>
+            <a:endParaRPr lang="en-US" sz="2500" dirty="0">
+              <a:latin typeface="Arial" panose="020B0604020202020204" pitchFamily="34" charset="0"/>
+              <a:cs typeface="Arial" panose="020B0604020202020204" pitchFamily="34" charset="0"/>
+            </a:endParaRPr>
+          </a:p>
+          <a:p>
+            <a:r>
+              <a:rPr lang="en-US" sz="2500" dirty="0">
+                <a:latin typeface="Arial" panose="020B0604020202020204" pitchFamily="34" charset="0"/>
+                <a:cs typeface="Arial" panose="020B0604020202020204" pitchFamily="34" charset="0"/>
+              </a:rPr>
+              <a:t>Also used Logistic Regression, SVM, Random Forest.</a:t>
             </a:r>
           </a:p>
         </p:txBody>
@@ -5438,7 +5625,7 @@
                     <a:latin typeface="Arial" panose="020B0604020202020204" pitchFamily="34" charset="0"/>
                     <a:cs typeface="Arial" panose="020B0604020202020204" pitchFamily="34" charset="0"/>
                   </a:rPr>
-                  <a:t>Weighted class-wise average </a:t>
+                  <a:t>  Weighted class-wise average </a:t>
                 </a:r>
                 <a14:m>
                   <m:oMath xmlns:m="http://schemas.openxmlformats.org/officeDocument/2006/math">
@@ -5588,21 +5775,7 @@
                                   <a:latin typeface="Cambria Math" panose="02040503050406030204" pitchFamily="18" charset="0"/>
                                   <a:cs typeface="Arial" panose="020B0604020202020204" pitchFamily="34" charset="0"/>
                                 </a:rPr>
-                                <m:t>(</m:t>
-                              </m:r>
-                              <m:r>
-                                <a:rPr lang="en-CA" sz="2500" b="0" i="1" dirty="0" smtClean="0">
-                                  <a:latin typeface="Cambria Math" panose="02040503050406030204" pitchFamily="18" charset="0"/>
-                                  <a:cs typeface="Arial" panose="020B0604020202020204" pitchFamily="34" charset="0"/>
-                                </a:rPr>
-                                <m:t>0</m:t>
-                              </m:r>
-                              <m:r>
-                                <a:rPr lang="en-CA" sz="2500" b="0" i="1" dirty="0" smtClean="0">
-                                  <a:latin typeface="Cambria Math" panose="02040503050406030204" pitchFamily="18" charset="0"/>
-                                  <a:cs typeface="Arial" panose="020B0604020202020204" pitchFamily="34" charset="0"/>
-                                </a:rPr>
-                                <m:t>)</m:t>
+                                <m:t>(0)</m:t>
                               </m:r>
                             </m:sup>
                           </m:sSubSup>
@@ -5646,21 +5819,7 @@
                                   <a:latin typeface="Cambria Math" panose="02040503050406030204" pitchFamily="18" charset="0"/>
                                   <a:cs typeface="Arial" panose="020B0604020202020204" pitchFamily="34" charset="0"/>
                                 </a:rPr>
-                                <m:t>(</m:t>
-                              </m:r>
-                              <m:r>
-                                <a:rPr lang="en-CA" sz="2500" b="0" i="1" dirty="0" smtClean="0">
-                                  <a:latin typeface="Cambria Math" panose="02040503050406030204" pitchFamily="18" charset="0"/>
-                                  <a:cs typeface="Arial" panose="020B0604020202020204" pitchFamily="34" charset="0"/>
-                                </a:rPr>
-                                <m:t>1</m:t>
-                              </m:r>
-                              <m:r>
-                                <a:rPr lang="en-CA" sz="2500" b="0" i="1" dirty="0" smtClean="0">
-                                  <a:latin typeface="Cambria Math" panose="02040503050406030204" pitchFamily="18" charset="0"/>
-                                  <a:cs typeface="Arial" panose="020B0604020202020204" pitchFamily="34" charset="0"/>
-                                </a:rPr>
-                                <m:t>)</m:t>
+                                <m:t>(1)</m:t>
                               </m:r>
                             </m:sup>
                           </m:sSubSup>
@@ -5704,21 +5863,7 @@
                                   <a:latin typeface="Cambria Math" panose="02040503050406030204" pitchFamily="18" charset="0"/>
                                   <a:cs typeface="Arial" panose="020B0604020202020204" pitchFamily="34" charset="0"/>
                                 </a:rPr>
-                                <m:t>(</m:t>
-                              </m:r>
-                              <m:r>
-                                <a:rPr lang="en-CA" sz="2500" b="0" i="1" dirty="0" smtClean="0">
-                                  <a:latin typeface="Cambria Math" panose="02040503050406030204" pitchFamily="18" charset="0"/>
-                                  <a:cs typeface="Arial" panose="020B0604020202020204" pitchFamily="34" charset="0"/>
-                                </a:rPr>
-                                <m:t>2</m:t>
-                              </m:r>
-                              <m:r>
-                                <a:rPr lang="en-CA" sz="2500" b="0" i="1" dirty="0" smtClean="0">
-                                  <a:latin typeface="Cambria Math" panose="02040503050406030204" pitchFamily="18" charset="0"/>
-                                  <a:cs typeface="Arial" panose="020B0604020202020204" pitchFamily="34" charset="0"/>
-                                </a:rPr>
-                                <m:t>)</m:t>
+                                <m:t>(2)</m:t>
                               </m:r>
                             </m:sup>
                           </m:sSubSup>
@@ -5770,7 +5915,7 @@
               <a:blipFill>
                 <a:blip r:embed="rId2"/>
                 <a:stretch>
-                  <a:fillRect l="-816" t="-2491"/>
+                  <a:fillRect t="-2491"/>
                 </a:stretch>
               </a:blipFill>
             </p:spPr>
@@ -5932,7 +6077,7 @@
                 <a:latin typeface="Calibri" panose="020F0502020204030204" pitchFamily="34" charset="0"/>
                 <a:cs typeface="Calibri" panose="020F0502020204030204" pitchFamily="34" charset="0"/>
               </a:rPr>
-              <a:t>Evaluation</a:t>
+              <a:t>HYPERTUNING</a:t>
             </a:r>
             <a:br>
               <a:rPr lang="en-US" sz="4400" dirty="0">
@@ -5967,8 +6112,8 @@
         </p:nvSpPr>
         <p:spPr>
           <a:xfrm>
-            <a:off x="1634543" y="1933922"/>
-            <a:ext cx="9603299" cy="2329420"/>
+            <a:off x="649357" y="2414574"/>
+            <a:ext cx="10575233" cy="2906501"/>
           </a:xfrm>
           <a:prstGeom prst="rect">
             <a:avLst/>
@@ -5993,7 +6138,7 @@
                 <a:latin typeface="Arial" panose="020B0604020202020204" pitchFamily="34" charset="0"/>
                 <a:cs typeface="Arial" panose="020B0604020202020204" pitchFamily="34" charset="0"/>
               </a:rPr>
-              <a:t>Oversampling of minority classes</a:t>
+              <a:t>5-fold cross-validation</a:t>
             </a:r>
           </a:p>
           <a:p>
@@ -6009,7 +6154,7 @@
                 <a:latin typeface="Arial" panose="020B0604020202020204" pitchFamily="34" charset="0"/>
                 <a:cs typeface="Arial" panose="020B0604020202020204" pitchFamily="34" charset="0"/>
               </a:rPr>
-              <a:t>5-fold cross-validation</a:t>
+              <a:t>Grid search</a:t>
             </a:r>
           </a:p>
           <a:p>
@@ -6021,13 +6166,211 @@
               <a:buChar char="Ø"/>
             </a:pPr>
             <a:r>
+              <a:rPr lang="en-US" sz="2500" dirty="0" err="1">
+                <a:latin typeface="Arial" panose="020B0604020202020204" pitchFamily="34" charset="0"/>
+                <a:cs typeface="Arial" panose="020B0604020202020204" pitchFamily="34" charset="0"/>
+              </a:rPr>
+              <a:t>Upsampling</a:t>
+            </a:r>
+            <a:r>
               <a:rPr lang="en-US" sz="2500" dirty="0">
                 <a:latin typeface="Arial" panose="020B0604020202020204" pitchFamily="34" charset="0"/>
                 <a:cs typeface="Arial" panose="020B0604020202020204" pitchFamily="34" charset="0"/>
               </a:rPr>
-              <a:t>Grid search</a:t>
-            </a:r>
-          </a:p>
+              <a:t> of minority classes had greatest impact</a:t>
+            </a:r>
+          </a:p>
+          <a:p>
+            <a:pPr marL="800100" lvl="1" indent="-342900">
+              <a:lnSpc>
+                <a:spcPct val="150000"/>
+              </a:lnSpc>
+              <a:buFont typeface="Wingdings" pitchFamily="2" charset="2"/>
+              <a:buChar char="Ø"/>
+            </a:pPr>
+            <a:r>
+              <a:rPr lang="en-US" sz="2500" dirty="0">
+                <a:latin typeface="Arial" panose="020B0604020202020204" pitchFamily="34" charset="0"/>
+                <a:cs typeface="Arial" panose="020B0604020202020204" pitchFamily="34" charset="0"/>
+              </a:rPr>
+              <a:t>Recall for fatal/serious accident class w/ no </a:t>
+            </a:r>
+            <a:r>
+              <a:rPr lang="en-US" sz="2500" dirty="0" err="1">
+                <a:latin typeface="Arial" panose="020B0604020202020204" pitchFamily="34" charset="0"/>
+                <a:cs typeface="Arial" panose="020B0604020202020204" pitchFamily="34" charset="0"/>
+              </a:rPr>
+              <a:t>upsampling</a:t>
+            </a:r>
+            <a:r>
+              <a:rPr lang="en-US" sz="2500" dirty="0">
+                <a:latin typeface="Arial" panose="020B0604020202020204" pitchFamily="34" charset="0"/>
+                <a:cs typeface="Arial" panose="020B0604020202020204" pitchFamily="34" charset="0"/>
+              </a:rPr>
+              <a:t>: 1%</a:t>
+            </a:r>
+          </a:p>
+          <a:p>
+            <a:pPr marL="800100" lvl="1" indent="-342900">
+              <a:lnSpc>
+                <a:spcPct val="150000"/>
+              </a:lnSpc>
+              <a:buFont typeface="Wingdings" pitchFamily="2" charset="2"/>
+              <a:buChar char="Ø"/>
+            </a:pPr>
+            <a:r>
+              <a:rPr lang="en-US" sz="2500" dirty="0">
+                <a:latin typeface="Arial" panose="020B0604020202020204" pitchFamily="34" charset="0"/>
+                <a:cs typeface="Arial" panose="020B0604020202020204" pitchFamily="34" charset="0"/>
+              </a:rPr>
+              <a:t>With </a:t>
+            </a:r>
+            <a:r>
+              <a:rPr lang="en-US" sz="2500" dirty="0" err="1">
+                <a:latin typeface="Arial" panose="020B0604020202020204" pitchFamily="34" charset="0"/>
+                <a:cs typeface="Arial" panose="020B0604020202020204" pitchFamily="34" charset="0"/>
+              </a:rPr>
+              <a:t>upsampling</a:t>
+            </a:r>
+            <a:r>
+              <a:rPr lang="en-US" sz="2500" dirty="0">
+                <a:latin typeface="Arial" panose="020B0604020202020204" pitchFamily="34" charset="0"/>
+                <a:cs typeface="Arial" panose="020B0604020202020204" pitchFamily="34" charset="0"/>
+              </a:rPr>
+              <a:t>: up to 65%</a:t>
+            </a:r>
+          </a:p>
+        </p:txBody>
+      </p:sp>
+    </p:spTree>
+    <p:extLst>
+      <p:ext uri="{BB962C8B-B14F-4D97-AF65-F5344CB8AC3E}">
+        <p14:creationId xmlns:p14="http://schemas.microsoft.com/office/powerpoint/2010/main" val="2478544999"/>
+      </p:ext>
+    </p:extLst>
+  </p:cSld>
+  <p:clrMapOvr>
+    <a:masterClrMapping/>
+  </p:clrMapOvr>
+</p:sld>
+</file>
+
+<file path=ppt/slides/slide8.xml><?xml version="1.0" encoding="utf-8"?>
+<p:sld xmlns:a="http://schemas.openxmlformats.org/drawingml/2006/main" xmlns:r="http://schemas.openxmlformats.org/officeDocument/2006/relationships" xmlns:p="http://schemas.openxmlformats.org/presentationml/2006/main" showMasterSp="0">
+  <p:cSld>
+    <p:spTree>
+      <p:nvGrpSpPr>
+        <p:cNvPr id="1" name=""/>
+        <p:cNvGrpSpPr/>
+        <p:nvPr/>
+      </p:nvGrpSpPr>
+      <p:grpSpPr>
+        <a:xfrm>
+          <a:off x="0" y="0"/>
+          <a:ext cx="0" cy="0"/>
+          <a:chOff x="0" y="0"/>
+          <a:chExt cx="0" cy="0"/>
+        </a:xfrm>
+      </p:grpSpPr>
+      <p:sp>
+        <p:nvSpPr>
+          <p:cNvPr id="2" name="Title 1">
+            <a:extLst>
+              <a:ext uri="{FF2B5EF4-FFF2-40B4-BE49-F238E27FC236}">
+                <a16:creationId xmlns:a16="http://schemas.microsoft.com/office/drawing/2014/main" id="{311671A4-866C-534A-125F-F22A758B4D6A}"/>
+              </a:ext>
+            </a:extLst>
+          </p:cNvPr>
+          <p:cNvSpPr>
+            <a:spLocks noGrp="1"/>
+          </p:cNvSpPr>
+          <p:nvPr>
+            <p:ph type="title"/>
+          </p:nvPr>
+        </p:nvSpPr>
+        <p:spPr>
+          <a:xfrm>
+            <a:off x="0" y="-1"/>
+            <a:ext cx="12192000" cy="1933903"/>
+          </a:xfrm>
+          <a:solidFill>
+            <a:schemeClr val="accent6">
+              <a:lumMod val="50000"/>
+            </a:schemeClr>
+          </a:solidFill>
+        </p:spPr>
+        <p:txBody>
+          <a:bodyPr>
+            <a:normAutofit/>
+          </a:bodyPr>
+          <a:lstStyle/>
+          <a:p>
+            <a:pPr algn="ctr"/>
+            <a:br>
+              <a:rPr lang="en-US" sz="4400" dirty="0">
+                <a:solidFill>
+                  <a:schemeClr val="bg1"/>
+                </a:solidFill>
+                <a:latin typeface="Calibri" panose="020F0502020204030204" pitchFamily="34" charset="0"/>
+                <a:cs typeface="Calibri" panose="020F0502020204030204" pitchFamily="34" charset="0"/>
+              </a:rPr>
+            </a:br>
+            <a:r>
+              <a:rPr lang="en-US" sz="4400" dirty="0">
+                <a:solidFill>
+                  <a:schemeClr val="bg1"/>
+                </a:solidFill>
+                <a:latin typeface="Calibri" panose="020F0502020204030204" pitchFamily="34" charset="0"/>
+                <a:cs typeface="Calibri" panose="020F0502020204030204" pitchFamily="34" charset="0"/>
+              </a:rPr>
+              <a:t>Evaluation</a:t>
+            </a:r>
+            <a:br>
+              <a:rPr lang="en-US" sz="4400" dirty="0">
+                <a:solidFill>
+                  <a:schemeClr val="bg1"/>
+                </a:solidFill>
+                <a:latin typeface="Calibri" panose="020F0502020204030204" pitchFamily="34" charset="0"/>
+                <a:cs typeface="Calibri" panose="020F0502020204030204" pitchFamily="34" charset="0"/>
+              </a:rPr>
+            </a:br>
+            <a:endParaRPr lang="en-US" sz="4400" dirty="0">
+              <a:solidFill>
+                <a:schemeClr val="bg1"/>
+              </a:solidFill>
+              <a:latin typeface="Calibri" panose="020F0502020204030204" pitchFamily="34" charset="0"/>
+              <a:cs typeface="Calibri" panose="020F0502020204030204" pitchFamily="34" charset="0"/>
+            </a:endParaRPr>
+          </a:p>
+        </p:txBody>
+      </p:sp>
+      <p:sp>
+        <p:nvSpPr>
+          <p:cNvPr id="5" name="TextBox 4">
+            <a:extLst>
+              <a:ext uri="{FF2B5EF4-FFF2-40B4-BE49-F238E27FC236}">
+                <a16:creationId xmlns:a16="http://schemas.microsoft.com/office/drawing/2014/main" id="{E0BFC89D-7166-3B1F-E53E-DBA2D398F867}"/>
+              </a:ext>
+            </a:extLst>
+          </p:cNvPr>
+          <p:cNvSpPr txBox="1"/>
+          <p:nvPr/>
+        </p:nvSpPr>
+        <p:spPr>
+          <a:xfrm>
+            <a:off x="1634543" y="2499833"/>
+            <a:ext cx="9603299" cy="598177"/>
+          </a:xfrm>
+          <a:prstGeom prst="rect">
+            <a:avLst/>
+          </a:prstGeom>
+          <a:noFill/>
+        </p:spPr>
+        <p:txBody>
+          <a:bodyPr wrap="square" rtlCol="0">
+            <a:spAutoFit/>
+          </a:bodyPr>
+          <a:lstStyle/>
           <a:p>
             <a:pPr marL="342900" indent="-342900">
               <a:lnSpc>
@@ -6046,8 +6389,8 @@
           </a:p>
         </p:txBody>
       </p:sp>
-      <mc:AlternateContent xmlns:mc="http://schemas.openxmlformats.org/markup-compatibility/2006" xmlns:a14="http://schemas.microsoft.com/office/drawing/2010/main">
-        <mc:Choice Requires="a14">
+      <mc:AlternateContent xmlns:mc="http://schemas.openxmlformats.org/markup-compatibility/2006">
+        <mc:Choice xmlns:a14="http://schemas.microsoft.com/office/drawing/2010/main" Requires="a14">
           <p:graphicFrame>
             <p:nvGraphicFramePr>
               <p:cNvPr id="3" name="Table 2">
@@ -6063,13 +6406,13 @@
               <p:nvPr>
                 <p:extLst>
                   <p:ext uri="{D42A27DB-BD31-4B8C-83A1-F6EECF244321}">
-                    <p14:modId xmlns:p14="http://schemas.microsoft.com/office/powerpoint/2010/main" val="2459944065"/>
+                    <p14:modId xmlns:p14="http://schemas.microsoft.com/office/powerpoint/2010/main" val="804077174"/>
                   </p:ext>
                 </p:extLst>
               </p:nvPr>
             </p:nvGraphicFramePr>
             <p:xfrm>
-              <a:off x="2312640" y="4262120"/>
+              <a:off x="2339144" y="3759991"/>
               <a:ext cx="6773335" cy="2595880"/>
             </p:xfrm>
             <a:graphic>
@@ -6673,7 +7016,7 @@
             </a:graphic>
           </p:graphicFrame>
         </mc:Choice>
-        <mc:Fallback xmlns="">
+        <mc:Fallback>
           <p:graphicFrame>
             <p:nvGraphicFramePr>
               <p:cNvPr id="3" name="Table 2">
@@ -6689,13 +7032,13 @@
               <p:nvPr>
                 <p:extLst>
                   <p:ext uri="{D42A27DB-BD31-4B8C-83A1-F6EECF244321}">
-                    <p14:modId xmlns:p14="http://schemas.microsoft.com/office/powerpoint/2010/main" val="2459944065"/>
+                    <p14:modId xmlns:p14="http://schemas.microsoft.com/office/powerpoint/2010/main" val="804077174"/>
                   </p:ext>
                 </p:extLst>
               </p:nvPr>
             </p:nvGraphicFramePr>
             <p:xfrm>
-              <a:off x="2312640" y="4262120"/>
+              <a:off x="2339144" y="3759991"/>
               <a:ext cx="6773335" cy="2595880"/>
             </p:xfrm>
             <a:graphic>
@@ -7216,7 +7559,7 @@
                         <a:blipFill>
                           <a:blip r:embed="rId2"/>
                           <a:stretch>
-                            <a:fillRect l="-25056" t="-606557" r="-225" b="-24590"/>
+                            <a:fillRect l="-25056" t="-608197" r="-225" b="-24590"/>
                           </a:stretch>
                         </a:blipFill>
                       </a:tcPr>
@@ -7266,7 +7609,7 @@
     </p:spTree>
     <p:extLst>
       <p:ext uri="{BB962C8B-B14F-4D97-AF65-F5344CB8AC3E}">
-        <p14:creationId xmlns:p14="http://schemas.microsoft.com/office/powerpoint/2010/main" val="2478544999"/>
+        <p14:creationId xmlns:p14="http://schemas.microsoft.com/office/powerpoint/2010/main" val="473497603"/>
       </p:ext>
     </p:extLst>
   </p:cSld>
@@ -7276,7 +7619,7 @@
 </p:sld>
 </file>
 
-<file path=ppt/slides/slide8.xml><?xml version="1.0" encoding="utf-8"?>
+<file path=ppt/slides/slide9.xml><?xml version="1.0" encoding="utf-8"?>
 <p:sld xmlns:a="http://schemas.openxmlformats.org/drawingml/2006/main" xmlns:r="http://schemas.openxmlformats.org/officeDocument/2006/relationships" xmlns:p="http://schemas.openxmlformats.org/presentationml/2006/main" showMasterSp="0">
   <p:cSld>
     <p:spTree>
@@ -7558,173 +7901,6 @@
       </p:par>
     </p:tnLst>
   </p:timing>
-</p:sld>
-</file>
-
-<file path=ppt/slides/slide9.xml><?xml version="1.0" encoding="utf-8"?>
-<p:sld xmlns:a="http://schemas.openxmlformats.org/drawingml/2006/main" xmlns:r="http://schemas.openxmlformats.org/officeDocument/2006/relationships" xmlns:p="http://schemas.openxmlformats.org/presentationml/2006/main" showMasterSp="0">
-  <p:cSld>
-    <p:spTree>
-      <p:nvGrpSpPr>
-        <p:cNvPr id="1" name=""/>
-        <p:cNvGrpSpPr/>
-        <p:nvPr/>
-      </p:nvGrpSpPr>
-      <p:grpSpPr>
-        <a:xfrm>
-          <a:off x="0" y="0"/>
-          <a:ext cx="0" cy="0"/>
-          <a:chOff x="0" y="0"/>
-          <a:chExt cx="0" cy="0"/>
-        </a:xfrm>
-      </p:grpSpPr>
-      <p:sp>
-        <p:nvSpPr>
-          <p:cNvPr id="2" name="Title 1">
-            <a:extLst>
-              <a:ext uri="{FF2B5EF4-FFF2-40B4-BE49-F238E27FC236}">
-                <a16:creationId xmlns:a16="http://schemas.microsoft.com/office/drawing/2014/main" id="{311671A4-866C-534A-125F-F22A758B4D6A}"/>
-              </a:ext>
-            </a:extLst>
-          </p:cNvPr>
-          <p:cNvSpPr>
-            <a:spLocks noGrp="1"/>
-          </p:cNvSpPr>
-          <p:nvPr>
-            <p:ph type="title"/>
-          </p:nvPr>
-        </p:nvSpPr>
-        <p:spPr>
-          <a:xfrm>
-            <a:off x="0" y="-1"/>
-            <a:ext cx="12192000" cy="1933903"/>
-          </a:xfrm>
-          <a:solidFill>
-            <a:schemeClr val="accent6">
-              <a:lumMod val="50000"/>
-            </a:schemeClr>
-          </a:solidFill>
-        </p:spPr>
-        <p:txBody>
-          <a:bodyPr>
-            <a:normAutofit/>
-          </a:bodyPr>
-          <a:lstStyle/>
-          <a:p>
-            <a:pPr algn="ctr"/>
-            <a:br>
-              <a:rPr lang="en-US" sz="4000" dirty="0">
-                <a:latin typeface="Calibri" panose="020F0502020204030204" pitchFamily="34" charset="0"/>
-                <a:cs typeface="Calibri" panose="020F0502020204030204" pitchFamily="34" charset="0"/>
-              </a:rPr>
-            </a:br>
-            <a:r>
-              <a:rPr lang="en-US" sz="4000" dirty="0">
-                <a:solidFill>
-                  <a:schemeClr val="bg1"/>
-                </a:solidFill>
-                <a:latin typeface="Calibri" panose="020F0502020204030204" pitchFamily="34" charset="0"/>
-                <a:cs typeface="Calibri" panose="020F0502020204030204" pitchFamily="34" charset="0"/>
-              </a:rPr>
-              <a:t>Potential Future Directions</a:t>
-            </a:r>
-            <a:r>
-              <a:rPr lang="en-US" sz="4000" dirty="0">
-                <a:latin typeface="Calibri" panose="020F0502020204030204" pitchFamily="34" charset="0"/>
-                <a:cs typeface="Calibri" panose="020F0502020204030204" pitchFamily="34" charset="0"/>
-              </a:rPr>
-              <a:t>	</a:t>
-            </a:r>
-            <a:br>
-              <a:rPr lang="en-US" sz="4000" dirty="0">
-                <a:latin typeface="Calibri" panose="020F0502020204030204" pitchFamily="34" charset="0"/>
-                <a:cs typeface="Calibri" panose="020F0502020204030204" pitchFamily="34" charset="0"/>
-              </a:rPr>
-            </a:br>
-            <a:endParaRPr lang="en-US" sz="4400" dirty="0">
-              <a:latin typeface="Calibri" panose="020F0502020204030204" pitchFamily="34" charset="0"/>
-              <a:cs typeface="Calibri" panose="020F0502020204030204" pitchFamily="34" charset="0"/>
-            </a:endParaRPr>
-          </a:p>
-        </p:txBody>
-      </p:sp>
-      <p:sp>
-        <p:nvSpPr>
-          <p:cNvPr id="4" name="TextBox 3">
-            <a:extLst>
-              <a:ext uri="{FF2B5EF4-FFF2-40B4-BE49-F238E27FC236}">
-                <a16:creationId xmlns:a16="http://schemas.microsoft.com/office/drawing/2014/main" id="{3BEA5A86-F493-7464-ED41-8D17A2F15931}"/>
-              </a:ext>
-            </a:extLst>
-          </p:cNvPr>
-          <p:cNvSpPr txBox="1"/>
-          <p:nvPr/>
-        </p:nvSpPr>
-        <p:spPr>
-          <a:xfrm>
-            <a:off x="1713722" y="3599844"/>
-            <a:ext cx="10478278" cy="1631216"/>
-          </a:xfrm>
-          <a:prstGeom prst="rect">
-            <a:avLst/>
-          </a:prstGeom>
-          <a:noFill/>
-        </p:spPr>
-        <p:txBody>
-          <a:bodyPr wrap="square" rtlCol="0">
-            <a:spAutoFit/>
-          </a:bodyPr>
-          <a:lstStyle/>
-          <a:p>
-            <a:pPr marL="285750" indent="-285750">
-              <a:buFont typeface="Wingdings" panose="05000000000000000000" pitchFamily="2" charset="2"/>
-              <a:buChar char="Ø"/>
-            </a:pPr>
-            <a:r>
-              <a:rPr lang="en-US" sz="2500" dirty="0">
-                <a:latin typeface="Arial" panose="020B0604020202020204" pitchFamily="34" charset="0"/>
-                <a:cs typeface="Arial" panose="020B0604020202020204" pitchFamily="34" charset="0"/>
-              </a:rPr>
-              <a:t>Data from other regions</a:t>
-            </a:r>
-          </a:p>
-          <a:p>
-            <a:endParaRPr lang="en-US" sz="2500" dirty="0">
-              <a:latin typeface="Arial" panose="020B0604020202020204" pitchFamily="34" charset="0"/>
-              <a:cs typeface="Arial" panose="020B0604020202020204" pitchFamily="34" charset="0"/>
-            </a:endParaRPr>
-          </a:p>
-          <a:p>
-            <a:endParaRPr lang="en-US" sz="2500" dirty="0">
-              <a:latin typeface="Arial" panose="020B0604020202020204" pitchFamily="34" charset="0"/>
-              <a:cs typeface="Arial" panose="020B0604020202020204" pitchFamily="34" charset="0"/>
-            </a:endParaRPr>
-          </a:p>
-          <a:p>
-            <a:pPr marL="285750" indent="-285750">
-              <a:buFont typeface="Wingdings" panose="05000000000000000000" pitchFamily="2" charset="2"/>
-              <a:buChar char="Ø"/>
-            </a:pPr>
-            <a:r>
-              <a:rPr lang="en-US" sz="2500" dirty="0">
-                <a:latin typeface="Arial" panose="020B0604020202020204" pitchFamily="34" charset="0"/>
-                <a:cs typeface="Arial" panose="020B0604020202020204" pitchFamily="34" charset="0"/>
-              </a:rPr>
-              <a:t>Different features: better models?</a:t>
-            </a:r>
-          </a:p>
-        </p:txBody>
-      </p:sp>
-    </p:spTree>
-    <p:extLst>
-      <p:ext uri="{BB962C8B-B14F-4D97-AF65-F5344CB8AC3E}">
-        <p14:creationId xmlns:p14="http://schemas.microsoft.com/office/powerpoint/2010/main" val="2581081781"/>
-      </p:ext>
-    </p:extLst>
-  </p:cSld>
-  <p:clrMapOvr>
-    <a:masterClrMapping/>
-  </p:clrMapOvr>
 </p:sld>
 </file>
 

</xml_diff>

<commit_message>
Switched order of metric/model selection slides
</commit_message>
<xml_diff>
--- a/presentation/Presentation_road_safety.pptx
+++ b/presentation/Presentation_road_safety.pptx
@@ -9,8 +9,8 @@
     <p:sldId id="262" r:id="rId3"/>
     <p:sldId id="266" r:id="rId4"/>
     <p:sldId id="279" r:id="rId5"/>
-    <p:sldId id="276" r:id="rId6"/>
-    <p:sldId id="280" r:id="rId7"/>
+    <p:sldId id="280" r:id="rId6"/>
+    <p:sldId id="276" r:id="rId7"/>
     <p:sldId id="267" r:id="rId8"/>
     <p:sldId id="281" r:id="rId9"/>
     <p:sldId id="272" r:id="rId10"/>
@@ -5214,8 +5214,10 @@
           <a:bodyPr rtlCol="0" anchor="ctr"/>
           <a:lstStyle/>
           <a:p>
-            <a:pPr algn="ctr"/>
-            <a:endParaRPr lang="en-US" dirty="0"/>
+            <a:r>
+              <a:rPr lang="en-US" dirty="0"/>
+              <a:t> </a:t>
+            </a:r>
           </a:p>
         </p:txBody>
       </p:sp>
@@ -5238,7 +5240,7 @@
         <p:spPr>
           <a:xfrm>
             <a:off x="0" y="-1"/>
-            <a:ext cx="12192000" cy="1643605"/>
+            <a:ext cx="12192000" cy="1940761"/>
           </a:xfrm>
           <a:solidFill>
             <a:schemeClr val="accent6">
@@ -5248,7 +5250,7 @@
         </p:spPr>
         <p:txBody>
           <a:bodyPr>
-            <a:noAutofit/>
+            <a:normAutofit/>
           </a:bodyPr>
           <a:lstStyle/>
           <a:p>
@@ -5270,7 +5272,7 @@
                 <a:latin typeface="Calibri" panose="020F0502020204030204" pitchFamily="34" charset="0"/>
                 <a:cs typeface="Calibri" panose="020F0502020204030204" pitchFamily="34" charset="0"/>
               </a:rPr>
-              <a:t>Model selection</a:t>
+              <a:t>METRIC</a:t>
             </a:r>
             <a:br>
               <a:rPr lang="en-US" sz="4400" dirty="0">
@@ -5291,307 +5293,8 @@
           </a:p>
         </p:txBody>
       </p:sp>
-      <p:sp>
-        <p:nvSpPr>
-          <p:cNvPr id="6" name="TextBox 5">
-            <a:extLst>
-              <a:ext uri="{FF2B5EF4-FFF2-40B4-BE49-F238E27FC236}">
-                <a16:creationId xmlns:a16="http://schemas.microsoft.com/office/drawing/2014/main" id="{FE59C9B6-A640-A03C-05B2-3A41021E26E8}"/>
-              </a:ext>
-            </a:extLst>
-          </p:cNvPr>
-          <p:cNvSpPr txBox="1"/>
-          <p:nvPr/>
-        </p:nvSpPr>
-        <p:spPr>
-          <a:xfrm>
-            <a:off x="988629" y="1834756"/>
-            <a:ext cx="10214742" cy="4324261"/>
-          </a:xfrm>
-          <a:prstGeom prst="rect">
-            <a:avLst/>
-          </a:prstGeom>
-          <a:noFill/>
-        </p:spPr>
-        <p:txBody>
-          <a:bodyPr wrap="square" rtlCol="0">
-            <a:spAutoFit/>
-          </a:bodyPr>
-          <a:lstStyle/>
-          <a:p>
-            <a:r>
-              <a:rPr lang="en-US" sz="2500" b="1" dirty="0" err="1">
-                <a:latin typeface="Arial" panose="020B0604020202020204" pitchFamily="34" charset="0"/>
-                <a:cs typeface="Arial" panose="020B0604020202020204" pitchFamily="34" charset="0"/>
-              </a:rPr>
-              <a:t>XGBoost</a:t>
-            </a:r>
-            <a:r>
-              <a:rPr lang="en-US" sz="2500" dirty="0">
-                <a:latin typeface="Arial" panose="020B0604020202020204" pitchFamily="34" charset="0"/>
-                <a:cs typeface="Arial" panose="020B0604020202020204" pitchFamily="34" charset="0"/>
-              </a:rPr>
-              <a:t> was selected for our ternary classification problem:</a:t>
-            </a:r>
-          </a:p>
-          <a:p>
-            <a:endParaRPr lang="en-US" sz="2500" dirty="0">
-              <a:latin typeface="Arial" panose="020B0604020202020204" pitchFamily="34" charset="0"/>
-              <a:cs typeface="Arial" panose="020B0604020202020204" pitchFamily="34" charset="0"/>
-            </a:endParaRPr>
-          </a:p>
-          <a:p>
-            <a:pPr marL="342900" indent="-342900">
-              <a:buFont typeface="Wingdings" panose="05000000000000000000" pitchFamily="2" charset="2"/>
-              <a:buChar char="Ø"/>
-            </a:pPr>
-            <a:r>
-              <a:rPr lang="en-US" sz="2500" dirty="0">
-                <a:latin typeface="Arial" panose="020B0604020202020204" pitchFamily="34" charset="0"/>
-                <a:cs typeface="Arial" panose="020B0604020202020204" pitchFamily="34" charset="0"/>
-              </a:rPr>
-              <a:t>Imbalanced dataset: 1% of accidents are serious/fatal, 20% minor.</a:t>
-            </a:r>
-          </a:p>
-          <a:p>
-            <a:pPr marL="342900" indent="-342900">
-              <a:buAutoNum type="arabicPeriod"/>
-            </a:pPr>
-            <a:endParaRPr lang="en-US" sz="2500" dirty="0">
-              <a:latin typeface="Arial" panose="020B0604020202020204" pitchFamily="34" charset="0"/>
-              <a:cs typeface="Arial" panose="020B0604020202020204" pitchFamily="34" charset="0"/>
-            </a:endParaRPr>
-          </a:p>
-          <a:p>
-            <a:pPr marL="342900" indent="-342900">
-              <a:buFont typeface="Wingdings" panose="05000000000000000000" pitchFamily="2" charset="2"/>
-              <a:buChar char="Ø"/>
-            </a:pPr>
-            <a:r>
-              <a:rPr lang="en-US" sz="2500" dirty="0">
-                <a:latin typeface="Arial" panose="020B0604020202020204" pitchFamily="34" charset="0"/>
-                <a:cs typeface="Arial" panose="020B0604020202020204" pitchFamily="34" charset="0"/>
-              </a:rPr>
-              <a:t>Speed and Efficiency</a:t>
-            </a:r>
-          </a:p>
-          <a:p>
-            <a:endParaRPr lang="en-US" sz="2500" dirty="0">
-              <a:latin typeface="Arial" panose="020B0604020202020204" pitchFamily="34" charset="0"/>
-              <a:cs typeface="Arial" panose="020B0604020202020204" pitchFamily="34" charset="0"/>
-            </a:endParaRPr>
-          </a:p>
-          <a:p>
-            <a:pPr marL="342900" indent="-342900">
-              <a:buFont typeface="Wingdings" panose="05000000000000000000" pitchFamily="2" charset="2"/>
-              <a:buChar char="Ø"/>
-            </a:pPr>
-            <a:r>
-              <a:rPr lang="en-US" sz="2500" dirty="0">
-                <a:latin typeface="Arial" panose="020B0604020202020204" pitchFamily="34" charset="0"/>
-                <a:cs typeface="Arial" panose="020B0604020202020204" pitchFamily="34" charset="0"/>
-              </a:rPr>
-              <a:t>Missing Values</a:t>
-            </a:r>
-          </a:p>
-          <a:p>
-            <a:endParaRPr lang="en-US" sz="2500" dirty="0">
-              <a:latin typeface="Arial" panose="020B0604020202020204" pitchFamily="34" charset="0"/>
-              <a:cs typeface="Arial" panose="020B0604020202020204" pitchFamily="34" charset="0"/>
-            </a:endParaRPr>
-          </a:p>
-          <a:p>
-            <a:pPr marL="342900" indent="-342900">
-              <a:buFont typeface="Wingdings" panose="05000000000000000000" pitchFamily="2" charset="2"/>
-              <a:buChar char="Ø"/>
-            </a:pPr>
-            <a:r>
-              <a:rPr lang="en-US" sz="2500" dirty="0">
-                <a:latin typeface="Arial" panose="020B0604020202020204" pitchFamily="34" charset="0"/>
-                <a:cs typeface="Arial" panose="020B0604020202020204" pitchFamily="34" charset="0"/>
-              </a:rPr>
-              <a:t>Feature Interaction Handling</a:t>
-            </a:r>
-          </a:p>
-          <a:p>
-            <a:pPr marL="342900" indent="-342900">
-              <a:buFont typeface="Wingdings" panose="05000000000000000000" pitchFamily="2" charset="2"/>
-              <a:buChar char="Ø"/>
-            </a:pPr>
-            <a:endParaRPr lang="en-US" sz="2500" dirty="0">
-              <a:latin typeface="Arial" panose="020B0604020202020204" pitchFamily="34" charset="0"/>
-              <a:cs typeface="Arial" panose="020B0604020202020204" pitchFamily="34" charset="0"/>
-            </a:endParaRPr>
-          </a:p>
-          <a:p>
-            <a:r>
-              <a:rPr lang="en-US" sz="2500" dirty="0">
-                <a:latin typeface="Arial" panose="020B0604020202020204" pitchFamily="34" charset="0"/>
-                <a:cs typeface="Arial" panose="020B0604020202020204" pitchFamily="34" charset="0"/>
-              </a:rPr>
-              <a:t>Also used Logistic Regression, SVM, Random Forest.</a:t>
-            </a:r>
-          </a:p>
-        </p:txBody>
-      </p:sp>
-    </p:spTree>
-    <p:extLst>
-      <p:ext uri="{BB962C8B-B14F-4D97-AF65-F5344CB8AC3E}">
-        <p14:creationId xmlns:p14="http://schemas.microsoft.com/office/powerpoint/2010/main" val="1724722943"/>
-      </p:ext>
-    </p:extLst>
-  </p:cSld>
-  <p:clrMapOvr>
-    <a:masterClrMapping/>
-  </p:clrMapOvr>
-</p:sld>
-</file>
-
-<file path=ppt/slides/slide6.xml><?xml version="1.0" encoding="utf-8"?>
-<p:sld xmlns:a="http://schemas.openxmlformats.org/drawingml/2006/main" xmlns:r="http://schemas.openxmlformats.org/officeDocument/2006/relationships" xmlns:p="http://schemas.openxmlformats.org/presentationml/2006/main">
-  <p:cSld>
-    <p:spTree>
-      <p:nvGrpSpPr>
-        <p:cNvPr id="1" name=""/>
-        <p:cNvGrpSpPr/>
-        <p:nvPr/>
-      </p:nvGrpSpPr>
-      <p:grpSpPr>
-        <a:xfrm>
-          <a:off x="0" y="0"/>
-          <a:ext cx="0" cy="0"/>
-          <a:chOff x="0" y="0"/>
-          <a:chExt cx="0" cy="0"/>
-        </a:xfrm>
-      </p:grpSpPr>
-      <p:sp>
-        <p:nvSpPr>
-          <p:cNvPr id="7" name="Rectangle 6">
-            <a:extLst>
-              <a:ext uri="{FF2B5EF4-FFF2-40B4-BE49-F238E27FC236}">
-                <a16:creationId xmlns:a16="http://schemas.microsoft.com/office/drawing/2014/main" id="{54C975D9-0DD9-1C38-B8A9-E5E9E7DFC118}"/>
-              </a:ext>
-            </a:extLst>
-          </p:cNvPr>
-          <p:cNvSpPr/>
-          <p:nvPr/>
-        </p:nvSpPr>
-        <p:spPr>
-          <a:xfrm>
-            <a:off x="0" y="1643604"/>
-            <a:ext cx="12192000" cy="5214396"/>
-          </a:xfrm>
-          <a:prstGeom prst="rect">
-            <a:avLst/>
-          </a:prstGeom>
-          <a:solidFill>
-            <a:schemeClr val="bg2"/>
-          </a:solidFill>
-          <a:ln>
-            <a:noFill/>
-          </a:ln>
-        </p:spPr>
-        <p:style>
-          <a:lnRef idx="2">
-            <a:schemeClr val="accent1">
-              <a:shade val="15000"/>
-            </a:schemeClr>
-          </a:lnRef>
-          <a:fillRef idx="1">
-            <a:schemeClr val="accent1"/>
-          </a:fillRef>
-          <a:effectRef idx="0">
-            <a:schemeClr val="accent1"/>
-          </a:effectRef>
-          <a:fontRef idx="minor">
-            <a:schemeClr val="lt1"/>
-          </a:fontRef>
-        </p:style>
-        <p:txBody>
-          <a:bodyPr rtlCol="0" anchor="ctr"/>
-          <a:lstStyle/>
-          <a:p>
-            <a:r>
-              <a:rPr lang="en-US" dirty="0"/>
-              <a:t> </a:t>
-            </a:r>
-          </a:p>
-        </p:txBody>
-      </p:sp>
-      <p:sp>
-        <p:nvSpPr>
-          <p:cNvPr id="4" name="Title 1">
-            <a:extLst>
-              <a:ext uri="{FF2B5EF4-FFF2-40B4-BE49-F238E27FC236}">
-                <a16:creationId xmlns:a16="http://schemas.microsoft.com/office/drawing/2014/main" id="{39FFFF3D-4EF9-C5DC-6C41-28BD7EF6E8D2}"/>
-              </a:ext>
-            </a:extLst>
-          </p:cNvPr>
-          <p:cNvSpPr>
-            <a:spLocks noGrp="1"/>
-          </p:cNvSpPr>
-          <p:nvPr>
-            <p:ph type="title"/>
-          </p:nvPr>
-        </p:nvSpPr>
-        <p:spPr>
-          <a:xfrm>
-            <a:off x="0" y="-1"/>
-            <a:ext cx="12192000" cy="1940761"/>
-          </a:xfrm>
-          <a:solidFill>
-            <a:schemeClr val="accent6">
-              <a:lumMod val="50000"/>
-            </a:schemeClr>
-          </a:solidFill>
-        </p:spPr>
-        <p:txBody>
-          <a:bodyPr>
-            <a:normAutofit/>
-          </a:bodyPr>
-          <a:lstStyle/>
-          <a:p>
-            <a:pPr algn="ctr"/>
-            <a:br>
-              <a:rPr lang="en-US" sz="4400" dirty="0">
-                <a:solidFill>
-                  <a:schemeClr val="bg1"/>
-                </a:solidFill>
-                <a:latin typeface="Calibri" panose="020F0502020204030204" pitchFamily="34" charset="0"/>
-                <a:cs typeface="Calibri" panose="020F0502020204030204" pitchFamily="34" charset="0"/>
-              </a:rPr>
-            </a:br>
-            <a:r>
-              <a:rPr lang="en-US" sz="4400" dirty="0">
-                <a:solidFill>
-                  <a:schemeClr val="bg1"/>
-                </a:solidFill>
-                <a:latin typeface="Calibri" panose="020F0502020204030204" pitchFamily="34" charset="0"/>
-                <a:cs typeface="Calibri" panose="020F0502020204030204" pitchFamily="34" charset="0"/>
-              </a:rPr>
-              <a:t>METRIC</a:t>
-            </a:r>
-            <a:br>
-              <a:rPr lang="en-US" sz="4400" dirty="0">
-                <a:solidFill>
-                  <a:schemeClr val="bg1"/>
-                </a:solidFill>
-                <a:latin typeface="Calibri" panose="020F0502020204030204" pitchFamily="34" charset="0"/>
-                <a:cs typeface="Calibri" panose="020F0502020204030204" pitchFamily="34" charset="0"/>
-              </a:rPr>
-            </a:br>
-            <a:endParaRPr lang="en-US" sz="4400" dirty="0">
-              <a:solidFill>
-                <a:schemeClr val="bg1"/>
-              </a:solidFill>
-              <a:latin typeface="Calibri" panose="020F0502020204030204" pitchFamily="34" charset="0"/>
-              <a:cs typeface="Calibri" panose="020F0502020204030204" pitchFamily="34" charset="0"/>
-            </a:endParaRPr>
-          </a:p>
-        </p:txBody>
-      </p:sp>
-      <mc:AlternateContent xmlns:mc="http://schemas.openxmlformats.org/markup-compatibility/2006">
-        <mc:Choice xmlns:a14="http://schemas.microsoft.com/office/drawing/2010/main" Requires="a14">
+      <mc:AlternateContent xmlns:mc="http://schemas.openxmlformats.org/markup-compatibility/2006" xmlns:a14="http://schemas.microsoft.com/office/drawing/2010/main">
+        <mc:Choice Requires="a14">
           <p:sp>
             <p:nvSpPr>
               <p:cNvPr id="6" name="TextBox 5">
@@ -5889,7 +5592,7 @@
             </p:txBody>
           </p:sp>
         </mc:Choice>
-        <mc:Fallback>
+        <mc:Fallback xmlns="">
           <p:sp>
             <p:nvSpPr>
               <p:cNvPr id="6" name="TextBox 5">
@@ -6009,6 +5712,303 @@
 </p:sld>
 </file>
 
+<file path=ppt/slides/slide6.xml><?xml version="1.0" encoding="utf-8"?>
+<p:sld xmlns:a="http://schemas.openxmlformats.org/drawingml/2006/main" xmlns:r="http://schemas.openxmlformats.org/officeDocument/2006/relationships" xmlns:p="http://schemas.openxmlformats.org/presentationml/2006/main">
+  <p:cSld>
+    <p:spTree>
+      <p:nvGrpSpPr>
+        <p:cNvPr id="1" name=""/>
+        <p:cNvGrpSpPr/>
+        <p:nvPr/>
+      </p:nvGrpSpPr>
+      <p:grpSpPr>
+        <a:xfrm>
+          <a:off x="0" y="0"/>
+          <a:ext cx="0" cy="0"/>
+          <a:chOff x="0" y="0"/>
+          <a:chExt cx="0" cy="0"/>
+        </a:xfrm>
+      </p:grpSpPr>
+      <p:sp>
+        <p:nvSpPr>
+          <p:cNvPr id="7" name="Rectangle 6">
+            <a:extLst>
+              <a:ext uri="{FF2B5EF4-FFF2-40B4-BE49-F238E27FC236}">
+                <a16:creationId xmlns:a16="http://schemas.microsoft.com/office/drawing/2014/main" id="{54C975D9-0DD9-1C38-B8A9-E5E9E7DFC118}"/>
+              </a:ext>
+            </a:extLst>
+          </p:cNvPr>
+          <p:cNvSpPr/>
+          <p:nvPr/>
+        </p:nvSpPr>
+        <p:spPr>
+          <a:xfrm>
+            <a:off x="0" y="1643604"/>
+            <a:ext cx="12192000" cy="5214396"/>
+          </a:xfrm>
+          <a:prstGeom prst="rect">
+            <a:avLst/>
+          </a:prstGeom>
+          <a:solidFill>
+            <a:schemeClr val="bg2"/>
+          </a:solidFill>
+          <a:ln>
+            <a:noFill/>
+          </a:ln>
+        </p:spPr>
+        <p:style>
+          <a:lnRef idx="2">
+            <a:schemeClr val="accent1">
+              <a:shade val="15000"/>
+            </a:schemeClr>
+          </a:lnRef>
+          <a:fillRef idx="1">
+            <a:schemeClr val="accent1"/>
+          </a:fillRef>
+          <a:effectRef idx="0">
+            <a:schemeClr val="accent1"/>
+          </a:effectRef>
+          <a:fontRef idx="minor">
+            <a:schemeClr val="lt1"/>
+          </a:fontRef>
+        </p:style>
+        <p:txBody>
+          <a:bodyPr rtlCol="0" anchor="ctr"/>
+          <a:lstStyle/>
+          <a:p>
+            <a:pPr algn="ctr"/>
+            <a:endParaRPr lang="en-US" dirty="0"/>
+          </a:p>
+        </p:txBody>
+      </p:sp>
+      <p:sp>
+        <p:nvSpPr>
+          <p:cNvPr id="4" name="Title 1">
+            <a:extLst>
+              <a:ext uri="{FF2B5EF4-FFF2-40B4-BE49-F238E27FC236}">
+                <a16:creationId xmlns:a16="http://schemas.microsoft.com/office/drawing/2014/main" id="{39FFFF3D-4EF9-C5DC-6C41-28BD7EF6E8D2}"/>
+              </a:ext>
+            </a:extLst>
+          </p:cNvPr>
+          <p:cNvSpPr>
+            <a:spLocks noGrp="1"/>
+          </p:cNvSpPr>
+          <p:nvPr>
+            <p:ph type="title"/>
+          </p:nvPr>
+        </p:nvSpPr>
+        <p:spPr>
+          <a:xfrm>
+            <a:off x="0" y="-1"/>
+            <a:ext cx="12192000" cy="1643605"/>
+          </a:xfrm>
+          <a:solidFill>
+            <a:schemeClr val="accent6">
+              <a:lumMod val="50000"/>
+            </a:schemeClr>
+          </a:solidFill>
+        </p:spPr>
+        <p:txBody>
+          <a:bodyPr>
+            <a:noAutofit/>
+          </a:bodyPr>
+          <a:lstStyle/>
+          <a:p>
+            <a:pPr algn="ctr"/>
+            <a:br>
+              <a:rPr lang="en-US" sz="4400" dirty="0">
+                <a:solidFill>
+                  <a:schemeClr val="bg1"/>
+                </a:solidFill>
+                <a:latin typeface="Calibri" panose="020F0502020204030204" pitchFamily="34" charset="0"/>
+                <a:cs typeface="Calibri" panose="020F0502020204030204" pitchFamily="34" charset="0"/>
+              </a:rPr>
+            </a:br>
+            <a:r>
+              <a:rPr lang="en-US" sz="4400" dirty="0">
+                <a:solidFill>
+                  <a:schemeClr val="bg1"/>
+                </a:solidFill>
+                <a:latin typeface="Calibri" panose="020F0502020204030204" pitchFamily="34" charset="0"/>
+                <a:cs typeface="Calibri" panose="020F0502020204030204" pitchFamily="34" charset="0"/>
+              </a:rPr>
+              <a:t>Model selection</a:t>
+            </a:r>
+            <a:br>
+              <a:rPr lang="en-US" sz="4400" dirty="0">
+                <a:solidFill>
+                  <a:schemeClr val="bg1"/>
+                </a:solidFill>
+                <a:latin typeface="Calibri" panose="020F0502020204030204" pitchFamily="34" charset="0"/>
+                <a:cs typeface="Calibri" panose="020F0502020204030204" pitchFamily="34" charset="0"/>
+              </a:rPr>
+            </a:br>
+            <a:endParaRPr lang="en-US" sz="4400" dirty="0">
+              <a:solidFill>
+                <a:schemeClr val="bg1"/>
+              </a:solidFill>
+              <a:latin typeface="Calibri" panose="020F0502020204030204" pitchFamily="34" charset="0"/>
+              <a:cs typeface="Calibri" panose="020F0502020204030204" pitchFamily="34" charset="0"/>
+            </a:endParaRPr>
+          </a:p>
+        </p:txBody>
+      </p:sp>
+      <p:sp>
+        <p:nvSpPr>
+          <p:cNvPr id="6" name="TextBox 5">
+            <a:extLst>
+              <a:ext uri="{FF2B5EF4-FFF2-40B4-BE49-F238E27FC236}">
+                <a16:creationId xmlns:a16="http://schemas.microsoft.com/office/drawing/2014/main" id="{FE59C9B6-A640-A03C-05B2-3A41021E26E8}"/>
+              </a:ext>
+            </a:extLst>
+          </p:cNvPr>
+          <p:cNvSpPr txBox="1"/>
+          <p:nvPr/>
+        </p:nvSpPr>
+        <p:spPr>
+          <a:xfrm>
+            <a:off x="988629" y="1834756"/>
+            <a:ext cx="10214742" cy="4324261"/>
+          </a:xfrm>
+          <a:prstGeom prst="rect">
+            <a:avLst/>
+          </a:prstGeom>
+          <a:noFill/>
+        </p:spPr>
+        <p:txBody>
+          <a:bodyPr wrap="square" rtlCol="0">
+            <a:spAutoFit/>
+          </a:bodyPr>
+          <a:lstStyle/>
+          <a:p>
+            <a:r>
+              <a:rPr lang="en-US" sz="2500" b="1" dirty="0" err="1">
+                <a:latin typeface="Arial" panose="020B0604020202020204" pitchFamily="34" charset="0"/>
+                <a:cs typeface="Arial" panose="020B0604020202020204" pitchFamily="34" charset="0"/>
+              </a:rPr>
+              <a:t>XGBoost</a:t>
+            </a:r>
+            <a:r>
+              <a:rPr lang="en-US" sz="2500" dirty="0">
+                <a:latin typeface="Arial" panose="020B0604020202020204" pitchFamily="34" charset="0"/>
+                <a:cs typeface="Arial" panose="020B0604020202020204" pitchFamily="34" charset="0"/>
+              </a:rPr>
+              <a:t> was selected for our ternary classification problem:</a:t>
+            </a:r>
+          </a:p>
+          <a:p>
+            <a:endParaRPr lang="en-US" sz="2500" dirty="0">
+              <a:latin typeface="Arial" panose="020B0604020202020204" pitchFamily="34" charset="0"/>
+              <a:cs typeface="Arial" panose="020B0604020202020204" pitchFamily="34" charset="0"/>
+            </a:endParaRPr>
+          </a:p>
+          <a:p>
+            <a:pPr marL="342900" indent="-342900">
+              <a:buFont typeface="Wingdings" panose="05000000000000000000" pitchFamily="2" charset="2"/>
+              <a:buChar char="Ø"/>
+            </a:pPr>
+            <a:r>
+              <a:rPr lang="en-US" sz="2500" dirty="0">
+                <a:latin typeface="Arial" panose="020B0604020202020204" pitchFamily="34" charset="0"/>
+                <a:cs typeface="Arial" panose="020B0604020202020204" pitchFamily="34" charset="0"/>
+              </a:rPr>
+              <a:t>Imbalanced dataset: 1% of accidents are serious/fatal, 20% minor.</a:t>
+            </a:r>
+          </a:p>
+          <a:p>
+            <a:pPr marL="342900" indent="-342900">
+              <a:buAutoNum type="arabicPeriod"/>
+            </a:pPr>
+            <a:endParaRPr lang="en-US" sz="2500" dirty="0">
+              <a:latin typeface="Arial" panose="020B0604020202020204" pitchFamily="34" charset="0"/>
+              <a:cs typeface="Arial" panose="020B0604020202020204" pitchFamily="34" charset="0"/>
+            </a:endParaRPr>
+          </a:p>
+          <a:p>
+            <a:pPr marL="342900" indent="-342900">
+              <a:buFont typeface="Wingdings" panose="05000000000000000000" pitchFamily="2" charset="2"/>
+              <a:buChar char="Ø"/>
+            </a:pPr>
+            <a:r>
+              <a:rPr lang="en-US" sz="2500" dirty="0">
+                <a:latin typeface="Arial" panose="020B0604020202020204" pitchFamily="34" charset="0"/>
+                <a:cs typeface="Arial" panose="020B0604020202020204" pitchFamily="34" charset="0"/>
+              </a:rPr>
+              <a:t>Speed and Efficiency</a:t>
+            </a:r>
+          </a:p>
+          <a:p>
+            <a:endParaRPr lang="en-US" sz="2500" dirty="0">
+              <a:latin typeface="Arial" panose="020B0604020202020204" pitchFamily="34" charset="0"/>
+              <a:cs typeface="Arial" panose="020B0604020202020204" pitchFamily="34" charset="0"/>
+            </a:endParaRPr>
+          </a:p>
+          <a:p>
+            <a:pPr marL="342900" indent="-342900">
+              <a:buFont typeface="Wingdings" panose="05000000000000000000" pitchFamily="2" charset="2"/>
+              <a:buChar char="Ø"/>
+            </a:pPr>
+            <a:r>
+              <a:rPr lang="en-US" sz="2500" dirty="0">
+                <a:latin typeface="Arial" panose="020B0604020202020204" pitchFamily="34" charset="0"/>
+                <a:cs typeface="Arial" panose="020B0604020202020204" pitchFamily="34" charset="0"/>
+              </a:rPr>
+              <a:t>Missing Values</a:t>
+            </a:r>
+          </a:p>
+          <a:p>
+            <a:endParaRPr lang="en-US" sz="2500" dirty="0">
+              <a:latin typeface="Arial" panose="020B0604020202020204" pitchFamily="34" charset="0"/>
+              <a:cs typeface="Arial" panose="020B0604020202020204" pitchFamily="34" charset="0"/>
+            </a:endParaRPr>
+          </a:p>
+          <a:p>
+            <a:pPr marL="342900" indent="-342900">
+              <a:buFont typeface="Wingdings" panose="05000000000000000000" pitchFamily="2" charset="2"/>
+              <a:buChar char="Ø"/>
+            </a:pPr>
+            <a:r>
+              <a:rPr lang="en-US" sz="2500" dirty="0">
+                <a:latin typeface="Arial" panose="020B0604020202020204" pitchFamily="34" charset="0"/>
+                <a:cs typeface="Arial" panose="020B0604020202020204" pitchFamily="34" charset="0"/>
+              </a:rPr>
+              <a:t>Feature Interaction Handling</a:t>
+            </a:r>
+          </a:p>
+          <a:p>
+            <a:pPr marL="342900" indent="-342900">
+              <a:buFont typeface="Wingdings" panose="05000000000000000000" pitchFamily="2" charset="2"/>
+              <a:buChar char="Ø"/>
+            </a:pPr>
+            <a:endParaRPr lang="en-US" sz="2500" dirty="0">
+              <a:latin typeface="Arial" panose="020B0604020202020204" pitchFamily="34" charset="0"/>
+              <a:cs typeface="Arial" panose="020B0604020202020204" pitchFamily="34" charset="0"/>
+            </a:endParaRPr>
+          </a:p>
+          <a:p>
+            <a:r>
+              <a:rPr lang="en-US" sz="2500" dirty="0">
+                <a:latin typeface="Arial" panose="020B0604020202020204" pitchFamily="34" charset="0"/>
+                <a:cs typeface="Arial" panose="020B0604020202020204" pitchFamily="34" charset="0"/>
+              </a:rPr>
+              <a:t>Also used Logistic Regression, SVM, Random Forest.</a:t>
+            </a:r>
+          </a:p>
+        </p:txBody>
+      </p:sp>
+    </p:spTree>
+    <p:extLst>
+      <p:ext uri="{BB962C8B-B14F-4D97-AF65-F5344CB8AC3E}">
+        <p14:creationId xmlns:p14="http://schemas.microsoft.com/office/powerpoint/2010/main" val="1724722943"/>
+      </p:ext>
+    </p:extLst>
+  </p:cSld>
+  <p:clrMapOvr>
+    <a:masterClrMapping/>
+  </p:clrMapOvr>
+</p:sld>
+</file>
+
 <file path=ppt/slides/slide7.xml><?xml version="1.0" encoding="utf-8"?>
 <p:sld xmlns:a="http://schemas.openxmlformats.org/drawingml/2006/main" xmlns:r="http://schemas.openxmlformats.org/officeDocument/2006/relationships" xmlns:p="http://schemas.openxmlformats.org/presentationml/2006/main" showMasterSp="0">
   <p:cSld>
@@ -6389,8 +6389,8 @@
           </a:p>
         </p:txBody>
       </p:sp>
-      <mc:AlternateContent xmlns:mc="http://schemas.openxmlformats.org/markup-compatibility/2006">
-        <mc:Choice xmlns:a14="http://schemas.microsoft.com/office/drawing/2010/main" Requires="a14">
+      <mc:AlternateContent xmlns:mc="http://schemas.openxmlformats.org/markup-compatibility/2006" xmlns:a14="http://schemas.microsoft.com/office/drawing/2010/main">
+        <mc:Choice Requires="a14">
           <p:graphicFrame>
             <p:nvGraphicFramePr>
               <p:cNvPr id="3" name="Table 2">
@@ -7016,7 +7016,7 @@
             </a:graphic>
           </p:graphicFrame>
         </mc:Choice>
-        <mc:Fallback>
+        <mc:Fallback xmlns="">
           <p:graphicFrame>
             <p:nvGraphicFramePr>
               <p:cNvPr id="3" name="Table 2">

</xml_diff>